<commit_message>
added few icons and fixed lightbox bug
</commit_message>
<xml_diff>
--- a/images/מצגת1.pptx
+++ b/images/מצגת1.pptx
@@ -7,7 +7,8 @@
   <p:sldIdLst>
     <p:sldId id="256" r:id="rId2"/>
     <p:sldId id="257" r:id="rId3"/>
-    <p:sldId id="258" r:id="rId4"/>
+    <p:sldId id="259" r:id="rId4"/>
+    <p:sldId id="258" r:id="rId5"/>
   </p:sldIdLst>
   <p:sldSz cx="12192000" cy="6858000"/>
   <p:notesSz cx="6858000" cy="9144000"/>
@@ -2971,44 +2972,85 @@
           <a:chExt cx="0" cy="0"/>
         </a:xfrm>
       </p:grpSpPr>
+      <p:pic>
+        <p:nvPicPr>
+          <p:cNvPr id="9" name="Picture 4" descr="Image result for iphone png"/>
+          <p:cNvPicPr>
+            <a:picLocks noChangeAspect="1" noChangeArrowheads="1"/>
+          </p:cNvPicPr>
+          <p:nvPr/>
+        </p:nvPicPr>
+        <p:blipFill>
+          <a:blip r:embed="rId2" cstate="print">
+            <a:extLst>
+              <a:ext uri="{28A0092B-C50C-407E-A947-70E740481C1C}">
+                <a14:useLocalDpi xmlns:a14="http://schemas.microsoft.com/office/drawing/2010/main" val="0"/>
+              </a:ext>
+            </a:extLst>
+          </a:blip>
+          <a:srcRect/>
+          <a:stretch>
+            <a:fillRect/>
+          </a:stretch>
+        </p:blipFill>
+        <p:spPr bwMode="auto">
+          <a:xfrm>
+            <a:off x="6859160" y="1762127"/>
+            <a:ext cx="3580239" cy="3602738"/>
+          </a:xfrm>
+          <a:prstGeom prst="rect">
+            <a:avLst/>
+          </a:prstGeom>
+          <a:noFill/>
+          <a:extLst>
+            <a:ext uri="{909E8E84-426E-40DD-AFC4-6F175D3DCCD1}">
+              <a14:hiddenFill xmlns:a14="http://schemas.microsoft.com/office/drawing/2010/main">
+                <a:solidFill>
+                  <a:srgbClr val="FFFFFF"/>
+                </a:solidFill>
+              </a14:hiddenFill>
+            </a:ext>
+          </a:extLst>
+        </p:spPr>
+      </p:pic>
       <p:grpSp>
         <p:nvGrpSpPr>
-          <p:cNvPr id="7" name="קבוצה 6"/>
+          <p:cNvPr id="26" name="קבוצה 25"/>
           <p:cNvGrpSpPr/>
           <p:nvPr/>
         </p:nvGrpSpPr>
         <p:grpSpPr>
           <a:xfrm>
-            <a:off x="2934860" y="1517514"/>
-            <a:ext cx="4185787" cy="4516627"/>
-            <a:chOff x="2934860" y="1517514"/>
-            <a:chExt cx="4185787" cy="4516627"/>
+            <a:off x="1677256" y="1648581"/>
+            <a:ext cx="2332769" cy="3486023"/>
+            <a:chOff x="1677256" y="1648581"/>
+            <a:chExt cx="2332769" cy="3486023"/>
           </a:xfrm>
         </p:grpSpPr>
         <p:grpSp>
           <p:nvGrpSpPr>
-            <p:cNvPr id="5" name="קבוצה 4"/>
+            <p:cNvPr id="25" name="קבוצה 24"/>
             <p:cNvGrpSpPr/>
             <p:nvPr/>
           </p:nvGrpSpPr>
           <p:grpSpPr>
             <a:xfrm>
-              <a:off x="3142034" y="1935961"/>
-              <a:ext cx="2033081" cy="4098180"/>
-              <a:chOff x="5406452" y="1664077"/>
-              <a:chExt cx="2032313" cy="4136601"/>
+              <a:off x="1677256" y="2153008"/>
+              <a:ext cx="1431004" cy="2981596"/>
+              <a:chOff x="1677256" y="2153008"/>
+              <a:chExt cx="1431004" cy="2981596"/>
             </a:xfrm>
           </p:grpSpPr>
           <p:pic>
             <p:nvPicPr>
-              <p:cNvPr id="1034" name="Picture 10" descr="Image result for iphone 7 png"/>
+              <p:cNvPr id="11" name="Picture 10" descr="Image result for iphone 7 png"/>
               <p:cNvPicPr>
                 <a:picLocks noChangeAspect="1" noChangeArrowheads="1"/>
               </p:cNvPicPr>
               <p:nvPr/>
             </p:nvPicPr>
             <p:blipFill>
-              <a:blip r:embed="rId2" cstate="print">
+              <a:blip r:embed="rId3" cstate="print">
                 <a:extLst>
                   <a:ext uri="{28A0092B-C50C-407E-A947-70E740481C1C}">
                     <a14:useLocalDpi xmlns:a14="http://schemas.microsoft.com/office/drawing/2010/main" val="0"/>
@@ -3022,8 +3064,8 @@
             </p:blipFill>
             <p:spPr bwMode="auto">
               <a:xfrm flipH="1">
-                <a:off x="5406452" y="1664077"/>
-                <a:ext cx="2032313" cy="4136601"/>
+                <a:off x="1677256" y="2153008"/>
+                <a:ext cx="1431004" cy="2981596"/>
               </a:xfrm>
               <a:prstGeom prst="rect">
                 <a:avLst/>
@@ -3042,22 +3084,22 @@
           </p:pic>
           <p:sp>
             <p:nvSpPr>
-              <p:cNvPr id="4" name="מלבן מעוגל 3"/>
+              <p:cNvPr id="12" name="מלבן מעוגל 11"/>
               <p:cNvSpPr/>
               <p:nvPr/>
             </p:nvSpPr>
             <p:spPr>
               <a:xfrm>
-                <a:off x="5532530" y="2160717"/>
-                <a:ext cx="1792399" cy="3082489"/>
+                <a:off x="1761721" y="2532901"/>
+                <a:ext cx="1262074" cy="2243887"/>
               </a:xfrm>
               <a:prstGeom prst="roundRect">
                 <a:avLst>
-                  <a:gd name="adj" fmla="val 1312"/>
+                  <a:gd name="adj" fmla="val 1689"/>
                 </a:avLst>
               </a:prstGeom>
               <a:blipFill>
-                <a:blip r:embed="rId3"/>
+                <a:blip r:embed="rId4"/>
                 <a:stretch>
                   <a:fillRect/>
                 </a:stretch>
@@ -3094,77 +3136,143 @@
         </p:grpSp>
         <p:grpSp>
           <p:nvGrpSpPr>
-            <p:cNvPr id="3" name="קבוצה 2"/>
+            <p:cNvPr id="8" name="קבוצה 7"/>
             <p:cNvGrpSpPr/>
             <p:nvPr/>
           </p:nvGrpSpPr>
           <p:grpSpPr>
             <a:xfrm>
-              <a:off x="2934860" y="1517514"/>
-              <a:ext cx="4185787" cy="4091850"/>
-              <a:chOff x="7438766" y="1664077"/>
-              <a:chExt cx="3703502" cy="3703502"/>
+              <a:off x="2459715" y="1648581"/>
+              <a:ext cx="1550310" cy="3128207"/>
+              <a:chOff x="2182684" y="1762127"/>
+              <a:chExt cx="1738960" cy="3490463"/>
             </a:xfrm>
           </p:grpSpPr>
-          <p:pic>
-            <p:nvPicPr>
-              <p:cNvPr id="9" name="Picture 4" descr="Image result for iphone png"/>
-              <p:cNvPicPr>
-                <a:picLocks noChangeAspect="1" noChangeArrowheads="1"/>
-              </p:cNvPicPr>
+          <p:grpSp>
+            <p:nvGrpSpPr>
+              <p:cNvPr id="13" name="קבוצה 12"/>
+              <p:cNvGrpSpPr/>
               <p:nvPr/>
-            </p:nvPicPr>
-            <p:blipFill>
-              <a:blip r:embed="rId4" cstate="print">
+            </p:nvGrpSpPr>
+            <p:grpSpPr>
+              <a:xfrm>
+                <a:off x="2182684" y="1762127"/>
+                <a:ext cx="1738960" cy="3490463"/>
+                <a:chOff x="5406452" y="1664077"/>
+                <a:chExt cx="2032313" cy="4136601"/>
+              </a:xfrm>
+            </p:grpSpPr>
+            <p:pic>
+              <p:nvPicPr>
+                <p:cNvPr id="14" name="Picture 10" descr="Image result for iphone 7 png"/>
+                <p:cNvPicPr>
+                  <a:picLocks noChangeAspect="1" noChangeArrowheads="1"/>
+                </p:cNvPicPr>
+                <p:nvPr/>
+              </p:nvPicPr>
+              <p:blipFill>
+                <a:blip r:embed="rId5" cstate="print">
+                  <a:extLst>
+                    <a:ext uri="{28A0092B-C50C-407E-A947-70E740481C1C}">
+                      <a14:useLocalDpi xmlns:a14="http://schemas.microsoft.com/office/drawing/2010/main" val="0"/>
+                    </a:ext>
+                  </a:extLst>
+                </a:blip>
+                <a:srcRect/>
+                <a:stretch>
+                  <a:fillRect/>
+                </a:stretch>
+              </p:blipFill>
+              <p:spPr bwMode="auto">
+                <a:xfrm flipH="1">
+                  <a:off x="5406452" y="1664077"/>
+                  <a:ext cx="2032313" cy="4136601"/>
+                </a:xfrm>
+                <a:prstGeom prst="rect">
+                  <a:avLst/>
+                </a:prstGeom>
+                <a:noFill/>
                 <a:extLst>
-                  <a:ext uri="{28A0092B-C50C-407E-A947-70E740481C1C}">
-                    <a14:useLocalDpi xmlns:a14="http://schemas.microsoft.com/office/drawing/2010/main" val="0"/>
+                  <a:ext uri="{909E8E84-426E-40DD-AFC4-6F175D3DCCD1}">
+                    <a14:hiddenFill xmlns:a14="http://schemas.microsoft.com/office/drawing/2010/main">
+                      <a:solidFill>
+                        <a:srgbClr val="FFFFFF"/>
+                      </a:solidFill>
+                    </a14:hiddenFill>
                   </a:ext>
                 </a:extLst>
-              </a:blip>
-              <a:srcRect/>
-              <a:stretch>
-                <a:fillRect/>
-              </a:stretch>
-            </p:blipFill>
-            <p:spPr bwMode="auto">
-              <a:xfrm>
-                <a:off x="7438766" y="1664077"/>
-                <a:ext cx="3703502" cy="3703502"/>
-              </a:xfrm>
-              <a:prstGeom prst="rect">
-                <a:avLst/>
-              </a:prstGeom>
-              <a:noFill/>
-              <a:extLst>
-                <a:ext uri="{909E8E84-426E-40DD-AFC4-6F175D3DCCD1}">
-                  <a14:hiddenFill xmlns:a14="http://schemas.microsoft.com/office/drawing/2010/main">
-                    <a:solidFill>
-                      <a:srgbClr val="FFFFFF"/>
-                    </a:solidFill>
-                  </a14:hiddenFill>
-                </a:ext>
-              </a:extLst>
-            </p:spPr>
-          </p:pic>
+              </p:spPr>
+            </p:pic>
+            <p:sp>
+              <p:nvSpPr>
+                <p:cNvPr id="15" name="מלבן מעוגל 14"/>
+                <p:cNvSpPr/>
+                <p:nvPr/>
+              </p:nvSpPr>
+              <p:spPr>
+                <a:xfrm>
+                  <a:off x="5532530" y="2160717"/>
+                  <a:ext cx="1792399" cy="3082489"/>
+                </a:xfrm>
+                <a:prstGeom prst="roundRect">
+                  <a:avLst>
+                    <a:gd name="adj" fmla="val 1312"/>
+                  </a:avLst>
+                </a:prstGeom>
+                <a:blipFill>
+                  <a:blip r:embed="rId6"/>
+                  <a:stretch>
+                    <a:fillRect/>
+                  </a:stretch>
+                </a:blipFill>
+                <a:ln>
+                  <a:noFill/>
+                </a:ln>
+              </p:spPr>
+              <p:style>
+                <a:lnRef idx="2">
+                  <a:schemeClr val="accent1">
+                    <a:shade val="50000"/>
+                  </a:schemeClr>
+                </a:lnRef>
+                <a:fillRef idx="1">
+                  <a:schemeClr val="accent1"/>
+                </a:fillRef>
+                <a:effectRef idx="0">
+                  <a:schemeClr val="accent1"/>
+                </a:effectRef>
+                <a:fontRef idx="minor">
+                  <a:schemeClr val="lt1"/>
+                </a:fontRef>
+              </p:style>
+              <p:txBody>
+                <a:bodyPr rtlCol="1" anchor="ctr"/>
+                <a:lstStyle/>
+                <a:p>
+                  <a:pPr algn="ctr"/>
+                  <a:endParaRPr lang="he-IL"/>
+                </a:p>
+              </p:txBody>
+            </p:sp>
+          </p:grpSp>
           <p:sp>
             <p:nvSpPr>
-              <p:cNvPr id="2" name="מלבן מעוגל 1"/>
+              <p:cNvPr id="16" name="מלבן מעוגל 15"/>
               <p:cNvSpPr/>
               <p:nvPr/>
             </p:nvSpPr>
             <p:spPr>
               <a:xfrm>
-                <a:off x="8534399" y="2189901"/>
-                <a:ext cx="1514475" cy="2544024"/>
+                <a:off x="2290563" y="2170717"/>
+                <a:ext cx="1533676" cy="2563208"/>
               </a:xfrm>
               <a:prstGeom prst="roundRect">
                 <a:avLst>
-                  <a:gd name="adj" fmla="val 2524"/>
+                  <a:gd name="adj" fmla="val 1964"/>
                 </a:avLst>
               </a:prstGeom>
               <a:blipFill dpi="0" rotWithShape="1">
-                <a:blip r:embed="rId5"/>
+                <a:blip r:embed="rId7"/>
                 <a:srcRect/>
                 <a:stretch>
                   <a:fillRect/>
@@ -3427,6 +3535,141 @@
           <a:chExt cx="0" cy="0"/>
         </a:xfrm>
       </p:grpSpPr>
+      <p:grpSp>
+        <p:nvGrpSpPr>
+          <p:cNvPr id="7" name="קבוצה 6"/>
+          <p:cNvGrpSpPr/>
+          <p:nvPr/>
+        </p:nvGrpSpPr>
+        <p:grpSpPr>
+          <a:xfrm>
+            <a:off x="7480301" y="1546860"/>
+            <a:ext cx="2051050" cy="3818005"/>
+            <a:chOff x="7480301" y="1546860"/>
+            <a:chExt cx="2051050" cy="3818005"/>
+          </a:xfrm>
+        </p:grpSpPr>
+        <p:pic>
+          <p:nvPicPr>
+            <p:cNvPr id="4" name="Picture 4" descr="Image result for iphone png"/>
+            <p:cNvPicPr>
+              <a:picLocks noChangeAspect="1" noChangeArrowheads="1"/>
+            </p:cNvPicPr>
+            <p:nvPr/>
+          </p:nvPicPr>
+          <p:blipFill rotWithShape="1">
+            <a:blip r:embed="rId2" cstate="print">
+              <a:extLst>
+                <a:ext uri="{28A0092B-C50C-407E-A947-70E740481C1C}">
+                  <a14:useLocalDpi xmlns:a14="http://schemas.microsoft.com/office/drawing/2010/main" val="0"/>
+                </a:ext>
+              </a:extLst>
+            </a:blip>
+            <a:srcRect l="22950" r="23644"/>
+            <a:stretch/>
+          </p:blipFill>
+          <p:spPr bwMode="auto">
+            <a:xfrm>
+              <a:off x="7480301" y="1546860"/>
+              <a:ext cx="2051050" cy="3818005"/>
+            </a:xfrm>
+            <a:prstGeom prst="rect">
+              <a:avLst/>
+            </a:prstGeom>
+            <a:noFill/>
+            <a:extLst>
+              <a:ext uri="{909E8E84-426E-40DD-AFC4-6F175D3DCCD1}">
+                <a14:hiddenFill xmlns:a14="http://schemas.microsoft.com/office/drawing/2010/main">
+                  <a:solidFill>
+                    <a:srgbClr val="FFFFFF"/>
+                  </a:solidFill>
+                </a14:hiddenFill>
+              </a:ext>
+            </a:extLst>
+          </p:spPr>
+        </p:pic>
+        <p:sp>
+          <p:nvSpPr>
+            <p:cNvPr id="6" name="מלבן מעוגל 5"/>
+            <p:cNvSpPr/>
+            <p:nvPr/>
+          </p:nvSpPr>
+          <p:spPr>
+            <a:xfrm>
+              <a:off x="7715249" y="2063750"/>
+              <a:ext cx="1607820" cy="2651760"/>
+            </a:xfrm>
+            <a:prstGeom prst="roundRect">
+              <a:avLst>
+                <a:gd name="adj" fmla="val 2370"/>
+              </a:avLst>
+            </a:prstGeom>
+            <a:blipFill>
+              <a:blip r:embed="rId3"/>
+              <a:stretch>
+                <a:fillRect/>
+              </a:stretch>
+            </a:blipFill>
+            <a:ln>
+              <a:noFill/>
+            </a:ln>
+          </p:spPr>
+          <p:style>
+            <a:lnRef idx="2">
+              <a:schemeClr val="accent1">
+                <a:shade val="50000"/>
+              </a:schemeClr>
+            </a:lnRef>
+            <a:fillRef idx="1">
+              <a:schemeClr val="accent1"/>
+            </a:fillRef>
+            <a:effectRef idx="0">
+              <a:schemeClr val="accent1"/>
+            </a:effectRef>
+            <a:fontRef idx="minor">
+              <a:schemeClr val="lt1"/>
+            </a:fontRef>
+          </p:style>
+          <p:txBody>
+            <a:bodyPr rtlCol="1" anchor="ctr"/>
+            <a:lstStyle/>
+            <a:p>
+              <a:pPr algn="ctr"/>
+              <a:endParaRPr lang="he-IL"/>
+            </a:p>
+          </p:txBody>
+        </p:sp>
+      </p:grpSp>
+    </p:spTree>
+    <p:extLst>
+      <p:ext uri="{BB962C8B-B14F-4D97-AF65-F5344CB8AC3E}">
+        <p14:creationId xmlns:p14="http://schemas.microsoft.com/office/powerpoint/2010/main" val="1009342334"/>
+      </p:ext>
+    </p:extLst>
+  </p:cSld>
+  <p:clrMapOvr>
+    <a:masterClrMapping/>
+  </p:clrMapOvr>
+</p:sld>
+</file>
+
+<file path=ppt/slides/slide4.xml><?xml version="1.0" encoding="utf-8"?>
+<p:sld xmlns:a="http://schemas.openxmlformats.org/drawingml/2006/main" xmlns:r="http://schemas.openxmlformats.org/officeDocument/2006/relationships" xmlns:p="http://schemas.openxmlformats.org/presentationml/2006/main">
+  <p:cSld>
+    <p:spTree>
+      <p:nvGrpSpPr>
+        <p:cNvPr id="1" name=""/>
+        <p:cNvGrpSpPr/>
+        <p:nvPr/>
+      </p:nvGrpSpPr>
+      <p:grpSpPr>
+        <a:xfrm>
+          <a:off x="0" y="0"/>
+          <a:ext cx="0" cy="0"/>
+          <a:chOff x="0" y="0"/>
+          <a:chExt cx="0" cy="0"/>
+        </a:xfrm>
+      </p:grpSpPr>
       <p:pic>
         <p:nvPicPr>
           <p:cNvPr id="4" name="תמונה 3"/>
@@ -3449,7 +3692,7 @@
         </p:blipFill>
         <p:spPr>
           <a:xfrm>
-            <a:off x="4686300" y="1315296"/>
+            <a:off x="4707731" y="1174802"/>
             <a:ext cx="381000" cy="381000"/>
           </a:xfrm>
           <a:prstGeom prst="rect">
@@ -3459,48 +3702,37 @@
       </p:pic>
       <p:pic>
         <p:nvPicPr>
-          <p:cNvPr id="1026" name="Picture 2" descr="Image result for israel icon"/>
+          <p:cNvPr id="7" name="תמונה 6"/>
           <p:cNvPicPr>
-            <a:picLocks noChangeAspect="1" noChangeArrowheads="1"/>
+            <a:picLocks noChangeAspect="1"/>
           </p:cNvPicPr>
           <p:nvPr/>
         </p:nvPicPr>
         <p:blipFill>
-          <a:blip r:embed="rId3">
+          <a:blip r:embed="rId3" cstate="print">
             <a:extLst>
               <a:ext uri="{28A0092B-C50C-407E-A947-70E740481C1C}">
                 <a14:useLocalDpi xmlns:a14="http://schemas.microsoft.com/office/drawing/2010/main" val="0"/>
               </a:ext>
             </a:extLst>
           </a:blip>
-          <a:srcRect/>
           <a:stretch>
             <a:fillRect/>
           </a:stretch>
         </p:blipFill>
-        <p:spPr bwMode="auto">
+        <p:spPr>
           <a:xfrm>
-            <a:off x="8903881" y="197969"/>
-            <a:ext cx="2808000" cy="2106001"/>
+            <a:off x="4176712" y="1314553"/>
+            <a:ext cx="383381" cy="381743"/>
           </a:xfrm>
           <a:prstGeom prst="rect">
             <a:avLst/>
           </a:prstGeom>
-          <a:noFill/>
-          <a:extLst>
-            <a:ext uri="{909E8E84-426E-40DD-AFC4-6F175D3DCCD1}">
-              <a14:hiddenFill xmlns:a14="http://schemas.microsoft.com/office/drawing/2010/main">
-                <a:solidFill>
-                  <a:srgbClr val="FFFFFF"/>
-                </a:solidFill>
-              </a14:hiddenFill>
-            </a:ext>
-          </a:extLst>
         </p:spPr>
       </p:pic>
       <p:pic>
         <p:nvPicPr>
-          <p:cNvPr id="7" name="תמונה 6"/>
+          <p:cNvPr id="2" name="תמונה 1"/>
           <p:cNvPicPr>
             <a:picLocks noChangeAspect="1"/>
           </p:cNvPicPr>
@@ -3520,12 +3752,194 @@
         </p:blipFill>
         <p:spPr>
           <a:xfrm>
-            <a:off x="4176712" y="1314553"/>
-            <a:ext cx="383381" cy="381743"/>
+            <a:off x="6045994" y="3378994"/>
+            <a:ext cx="238998" cy="238998"/>
           </a:xfrm>
           <a:prstGeom prst="rect">
             <a:avLst/>
           </a:prstGeom>
+        </p:spPr>
+      </p:pic>
+      <p:pic>
+        <p:nvPicPr>
+          <p:cNvPr id="3" name="תמונה 2"/>
+          <p:cNvPicPr>
+            <a:picLocks noChangeAspect="1"/>
+          </p:cNvPicPr>
+          <p:nvPr/>
+        </p:nvPicPr>
+        <p:blipFill>
+          <a:blip r:embed="rId5" cstate="print">
+            <a:extLst>
+              <a:ext uri="{28A0092B-C50C-407E-A947-70E740481C1C}">
+                <a14:useLocalDpi xmlns:a14="http://schemas.microsoft.com/office/drawing/2010/main" val="0"/>
+              </a:ext>
+            </a:extLst>
+          </a:blip>
+          <a:stretch>
+            <a:fillRect/>
+          </a:stretch>
+        </p:blipFill>
+        <p:spPr>
+          <a:xfrm>
+            <a:off x="5868799" y="3378994"/>
+            <a:ext cx="253740" cy="249713"/>
+          </a:xfrm>
+          <a:prstGeom prst="rect">
+            <a:avLst/>
+          </a:prstGeom>
+        </p:spPr>
+      </p:pic>
+      <p:pic>
+        <p:nvPicPr>
+          <p:cNvPr id="5" name="תמונה 4"/>
+          <p:cNvPicPr>
+            <a:picLocks noChangeAspect="1"/>
+          </p:cNvPicPr>
+          <p:nvPr/>
+        </p:nvPicPr>
+        <p:blipFill rotWithShape="1">
+          <a:blip r:embed="rId6" cstate="print">
+            <a:extLst>
+              <a:ext uri="{28A0092B-C50C-407E-A947-70E740481C1C}">
+                <a14:useLocalDpi xmlns:a14="http://schemas.microsoft.com/office/drawing/2010/main" val="0"/>
+              </a:ext>
+            </a:extLst>
+          </a:blip>
+          <a:srcRect l="18434" t="15300" r="15419" b="16384"/>
+          <a:stretch/>
+        </p:blipFill>
+        <p:spPr>
+          <a:xfrm>
+            <a:off x="1319213" y="4826794"/>
+            <a:ext cx="145256" cy="150019"/>
+          </a:xfrm>
+          <a:prstGeom prst="rect">
+            <a:avLst/>
+          </a:prstGeom>
+        </p:spPr>
+      </p:pic>
+      <p:grpSp>
+        <p:nvGrpSpPr>
+          <p:cNvPr id="6" name="קבוצה 5"/>
+          <p:cNvGrpSpPr/>
+          <p:nvPr/>
+        </p:nvGrpSpPr>
+        <p:grpSpPr>
+          <a:xfrm>
+            <a:off x="1962150" y="4148139"/>
+            <a:ext cx="237185" cy="242887"/>
+            <a:chOff x="919162" y="1999932"/>
+            <a:chExt cx="3257550" cy="3257550"/>
+          </a:xfrm>
+        </p:grpSpPr>
+        <p:pic>
+          <p:nvPicPr>
+            <p:cNvPr id="8" name="תמונה 7"/>
+            <p:cNvPicPr>
+              <a:picLocks noChangeAspect="1"/>
+            </p:cNvPicPr>
+            <p:nvPr/>
+          </p:nvPicPr>
+          <p:blipFill>
+            <a:blip r:embed="rId7" cstate="print">
+              <a:extLst>
+                <a:ext uri="{28A0092B-C50C-407E-A947-70E740481C1C}">
+                  <a14:useLocalDpi xmlns:a14="http://schemas.microsoft.com/office/drawing/2010/main" val="0"/>
+                </a:ext>
+              </a:extLst>
+            </a:blip>
+            <a:stretch>
+              <a:fillRect/>
+            </a:stretch>
+          </p:blipFill>
+          <p:spPr>
+            <a:xfrm>
+              <a:off x="919162" y="1999932"/>
+              <a:ext cx="3257550" cy="3257550"/>
+            </a:xfrm>
+            <a:prstGeom prst="rect">
+              <a:avLst/>
+            </a:prstGeom>
+          </p:spPr>
+        </p:pic>
+        <p:pic>
+          <p:nvPicPr>
+            <p:cNvPr id="9" name="Picture 2" descr="Image result for israel icon"/>
+            <p:cNvPicPr>
+              <a:picLocks noChangeAspect="1" noChangeArrowheads="1"/>
+            </p:cNvPicPr>
+            <p:nvPr/>
+          </p:nvPicPr>
+          <p:blipFill rotWithShape="1">
+            <a:blip r:embed="rId8" cstate="print">
+              <a:extLst>
+                <a:ext uri="{28A0092B-C50C-407E-A947-70E740481C1C}">
+                  <a14:useLocalDpi xmlns:a14="http://schemas.microsoft.com/office/drawing/2010/main" val="0"/>
+                </a:ext>
+              </a:extLst>
+            </a:blip>
+            <a:srcRect l="16741" t="-2" r="17099" b="7246"/>
+            <a:stretch/>
+          </p:blipFill>
+          <p:spPr bwMode="auto">
+            <a:xfrm>
+              <a:off x="1507852" y="2543177"/>
+              <a:ext cx="2125796" cy="2235236"/>
+            </a:xfrm>
+            <a:prstGeom prst="rect">
+              <a:avLst/>
+            </a:prstGeom>
+            <a:noFill/>
+            <a:extLst>
+              <a:ext uri="{909E8E84-426E-40DD-AFC4-6F175D3DCCD1}">
+                <a14:hiddenFill xmlns:a14="http://schemas.microsoft.com/office/drawing/2010/main">
+                  <a:solidFill>
+                    <a:srgbClr val="FFFFFF"/>
+                  </a:solidFill>
+                </a14:hiddenFill>
+              </a:ext>
+            </a:extLst>
+          </p:spPr>
+        </p:pic>
+      </p:grpSp>
+      <p:pic>
+        <p:nvPicPr>
+          <p:cNvPr id="11" name="Picture 2" descr="Image result for israel icon"/>
+          <p:cNvPicPr>
+            <a:picLocks noChangeAspect="1" noChangeArrowheads="1"/>
+          </p:cNvPicPr>
+          <p:nvPr/>
+        </p:nvPicPr>
+        <p:blipFill rotWithShape="1">
+          <a:blip r:embed="rId9" cstate="print">
+            <a:extLst>
+              <a:ext uri="{28A0092B-C50C-407E-A947-70E740481C1C}">
+                <a14:useLocalDpi xmlns:a14="http://schemas.microsoft.com/office/drawing/2010/main" val="0"/>
+              </a:ext>
+            </a:extLst>
+          </a:blip>
+          <a:srcRect l="16741" t="-2" r="17099" b="7246"/>
+          <a:stretch/>
+        </p:blipFill>
+        <p:spPr bwMode="auto">
+          <a:xfrm>
+            <a:off x="1319214" y="4829174"/>
+            <a:ext cx="145255" cy="154779"/>
+          </a:xfrm>
+          <a:prstGeom prst="rect">
+            <a:avLst/>
+          </a:prstGeom>
+          <a:noFill/>
+          <a:extLst>
+            <a:ext uri="{909E8E84-426E-40DD-AFC4-6F175D3DCCD1}">
+              <a14:hiddenFill xmlns:a14="http://schemas.microsoft.com/office/drawing/2010/main">
+                <a:solidFill>
+                  <a:srgbClr val="FFFFFF"/>
+                </a:solidFill>
+              </a14:hiddenFill>
+            </a:ext>
+          </a:extLst>
         </p:spPr>
       </p:pic>
     </p:spTree>

</xml_diff>